<commit_message>
update diapo pr eric
</commit_message>
<xml_diff>
--- a/00 - Documentation/presentation_eric/presentation_lancement_projet.pptx
+++ b/00 - Documentation/presentation_eric/presentation_lancement_projet.pptx
@@ -10,12 +10,16 @@
     <p:sldId id="258" r:id="rId4"/>
     <p:sldId id="260" r:id="rId5"/>
     <p:sldId id="259" r:id="rId6"/>
-    <p:sldId id="261" r:id="rId7"/>
-    <p:sldId id="266" r:id="rId8"/>
-    <p:sldId id="262" r:id="rId9"/>
-    <p:sldId id="263" r:id="rId10"/>
-    <p:sldId id="264" r:id="rId11"/>
-    <p:sldId id="265" r:id="rId12"/>
+    <p:sldId id="271" r:id="rId7"/>
+    <p:sldId id="261" r:id="rId8"/>
+    <p:sldId id="266" r:id="rId9"/>
+    <p:sldId id="262" r:id="rId10"/>
+    <p:sldId id="269" r:id="rId11"/>
+    <p:sldId id="267" r:id="rId12"/>
+    <p:sldId id="268" r:id="rId13"/>
+    <p:sldId id="270" r:id="rId14"/>
+    <p:sldId id="263" r:id="rId15"/>
+    <p:sldId id="272" r:id="rId16"/>
   </p:sldIdLst>
   <p:sldSz cx="12192000" cy="6858000"/>
   <p:notesSz cx="6858000" cy="9144000"/>
@@ -114,6 +118,11 @@
       </a:defRPr>
     </a:lvl9pPr>
   </p:defaultTextStyle>
+  <p:extLst>
+    <p:ext uri="{EFAFB233-063F-42B5-8137-9DF3F51BA10A}">
+      <p15:sldGuideLst xmlns:p15="http://schemas.microsoft.com/office/powerpoint/2012/main"/>
+    </p:ext>
+  </p:extLst>
 </p:presentation>
 </file>
 
@@ -1115,6 +1124,13 @@
         </dgm:presLayoutVars>
       </dgm:prSet>
       <dgm:spPr/>
+      <dgm:t>
+        <a:bodyPr/>
+        <a:lstStyle/>
+        <a:p>
+          <a:endParaRPr lang="fr-FR"/>
+        </a:p>
+      </dgm:t>
     </dgm:pt>
     <dgm:pt modelId="{28557DD7-8D9B-4BB0-ADC4-61D8C09450B3}" type="pres">
       <dgm:prSet presAssocID="{2681C462-2534-436D-BAAC-013CDD61D5F3}" presName="composite" presStyleCnt="0"/>
@@ -1155,14 +1171,35 @@
         </dgm:presLayoutVars>
       </dgm:prSet>
       <dgm:spPr/>
+      <dgm:t>
+        <a:bodyPr/>
+        <a:lstStyle/>
+        <a:p>
+          <a:endParaRPr lang="fr-FR"/>
+        </a:p>
+      </dgm:t>
     </dgm:pt>
     <dgm:pt modelId="{EE046494-B2A4-4A5C-8FE0-78B74CD96D41}" type="pres">
       <dgm:prSet presAssocID="{56F62F40-C3FC-4CDE-8CDE-08742BB7EC5F}" presName="sibTrans" presStyleLbl="sibTrans2D1" presStyleIdx="0" presStyleCnt="2"/>
       <dgm:spPr/>
+      <dgm:t>
+        <a:bodyPr/>
+        <a:lstStyle/>
+        <a:p>
+          <a:endParaRPr lang="fr-FR"/>
+        </a:p>
+      </dgm:t>
     </dgm:pt>
     <dgm:pt modelId="{8577333B-3F9C-4926-A988-A9AD25C07B07}" type="pres">
       <dgm:prSet presAssocID="{56F62F40-C3FC-4CDE-8CDE-08742BB7EC5F}" presName="connTx" presStyleLbl="sibTrans2D1" presStyleIdx="0" presStyleCnt="2"/>
       <dgm:spPr/>
+      <dgm:t>
+        <a:bodyPr/>
+        <a:lstStyle/>
+        <a:p>
+          <a:endParaRPr lang="fr-FR"/>
+        </a:p>
+      </dgm:t>
     </dgm:pt>
     <dgm:pt modelId="{57853234-F657-4085-8014-AFBBB0C0BF0C}" type="pres">
       <dgm:prSet presAssocID="{EA203AA0-1634-4AEA-A278-3E43E8C7A4EE}" presName="composite" presStyleCnt="0"/>
@@ -1203,14 +1240,35 @@
         </dgm:presLayoutVars>
       </dgm:prSet>
       <dgm:spPr/>
+      <dgm:t>
+        <a:bodyPr/>
+        <a:lstStyle/>
+        <a:p>
+          <a:endParaRPr lang="fr-FR"/>
+        </a:p>
+      </dgm:t>
     </dgm:pt>
     <dgm:pt modelId="{665F6B15-2E65-46FD-986F-0FA3BC9A6879}" type="pres">
       <dgm:prSet presAssocID="{C6F74580-CCD9-44AD-A3A1-24C2F9A9A6DF}" presName="sibTrans" presStyleLbl="sibTrans2D1" presStyleIdx="1" presStyleCnt="2"/>
       <dgm:spPr/>
+      <dgm:t>
+        <a:bodyPr/>
+        <a:lstStyle/>
+        <a:p>
+          <a:endParaRPr lang="fr-FR"/>
+        </a:p>
+      </dgm:t>
     </dgm:pt>
     <dgm:pt modelId="{D2CD5A19-CB24-4411-9A3F-E5486E7FC276}" type="pres">
       <dgm:prSet presAssocID="{C6F74580-CCD9-44AD-A3A1-24C2F9A9A6DF}" presName="connTx" presStyleLbl="sibTrans2D1" presStyleIdx="1" presStyleCnt="2"/>
       <dgm:spPr/>
+      <dgm:t>
+        <a:bodyPr/>
+        <a:lstStyle/>
+        <a:p>
+          <a:endParaRPr lang="fr-FR"/>
+        </a:p>
+      </dgm:t>
     </dgm:pt>
     <dgm:pt modelId="{04016CBF-C6A4-48E2-8A88-EEDFAC8C756C}" type="pres">
       <dgm:prSet presAssocID="{7430520C-DD82-48EA-943B-E9AC08324B1C}" presName="composite" presStyleCnt="0"/>
@@ -1261,26 +1319,26 @@
     </dgm:pt>
   </dgm:ptLst>
   <dgm:cxnLst>
-    <dgm:cxn modelId="{DA4444BD-259E-4887-80A5-28DAFBB20A60}" type="presOf" srcId="{F0BDC9F1-6AA2-488E-A7C7-F3AC9907CA77}" destId="{0F897744-CD25-45D4-B9B9-987B482AC437}" srcOrd="0" destOrd="0" presId="urn:microsoft.com/office/officeart/2005/8/layout/process3"/>
-    <dgm:cxn modelId="{656FE334-AFC2-48B4-A41B-43F36A767E95}" type="presOf" srcId="{C6F74580-CCD9-44AD-A3A1-24C2F9A9A6DF}" destId="{D2CD5A19-CB24-4411-9A3F-E5486E7FC276}" srcOrd="1" destOrd="0" presId="urn:microsoft.com/office/officeart/2005/8/layout/process3"/>
-    <dgm:cxn modelId="{114C5B6E-19A9-4F4B-8534-F0E2107E621C}" srcId="{EA203AA0-1634-4AEA-A278-3E43E8C7A4EE}" destId="{42D947BE-DAD4-42C6-9CF1-0E85614AFABC}" srcOrd="0" destOrd="0" parTransId="{79EE3B1C-7960-4154-B352-97C552D82A2D}" sibTransId="{87387704-1D90-461B-972A-43A192ACF00E}"/>
-    <dgm:cxn modelId="{66E42723-C25E-4A9A-A8DF-486C1E4A3DE2}" type="presOf" srcId="{F8B11C22-81F6-4198-A5E8-C2D9969C301E}" destId="{36FBB6DB-AE48-4AF2-92A9-83C28B33E39A}" srcOrd="0" destOrd="0" presId="urn:microsoft.com/office/officeart/2005/8/layout/process3"/>
-    <dgm:cxn modelId="{731F9A29-65D3-4089-A21C-7684D2BFF107}" type="presOf" srcId="{EA203AA0-1634-4AEA-A278-3E43E8C7A4EE}" destId="{834BAC12-5A20-417C-85FE-A1BDA447FA36}" srcOrd="0" destOrd="0" presId="urn:microsoft.com/office/officeart/2005/8/layout/process3"/>
-    <dgm:cxn modelId="{4738627A-D0D4-4B56-9989-D8B22FAA5A07}" type="presOf" srcId="{2681C462-2534-436D-BAAC-013CDD61D5F3}" destId="{2AD3D7E7-80DE-4882-A864-F1C346E6920D}" srcOrd="1" destOrd="0" presId="urn:microsoft.com/office/officeart/2005/8/layout/process3"/>
-    <dgm:cxn modelId="{715C0077-E68A-41A3-8A6E-8093909AA3B2}" type="presOf" srcId="{EA203AA0-1634-4AEA-A278-3E43E8C7A4EE}" destId="{D9F6C6A3-9F07-4B1E-888E-563845B021C7}" srcOrd="1" destOrd="0" presId="urn:microsoft.com/office/officeart/2005/8/layout/process3"/>
-    <dgm:cxn modelId="{615AC532-C44B-4222-860E-E2DF108EA3ED}" srcId="{7430520C-DD82-48EA-943B-E9AC08324B1C}" destId="{F0BDC9F1-6AA2-488E-A7C7-F3AC9907CA77}" srcOrd="0" destOrd="0" parTransId="{2400E606-C13E-4194-BBAE-708C417EF550}" sibTransId="{F8033E8A-46EB-4CD2-A83C-E530145F59FF}"/>
-    <dgm:cxn modelId="{18B7DF32-5095-428A-9F97-FDBBFD598834}" type="presOf" srcId="{7430520C-DD82-48EA-943B-E9AC08324B1C}" destId="{3D736581-7702-4485-84CF-B2F64CA9089B}" srcOrd="0" destOrd="0" presId="urn:microsoft.com/office/officeart/2005/8/layout/process3"/>
-    <dgm:cxn modelId="{892B74B8-A168-47A2-B608-00C9E7C73564}" type="presOf" srcId="{C6F74580-CCD9-44AD-A3A1-24C2F9A9A6DF}" destId="{665F6B15-2E65-46FD-986F-0FA3BC9A6879}" srcOrd="0" destOrd="0" presId="urn:microsoft.com/office/officeart/2005/8/layout/process3"/>
     <dgm:cxn modelId="{368AAE4A-DF95-44CE-94FC-09EB7A1624F5}" type="presOf" srcId="{0FE21134-2CD0-49CE-803B-B52745D979EA}" destId="{75268F86-1AAD-45AA-9F81-2D48FB93F47D}" srcOrd="0" destOrd="0" presId="urn:microsoft.com/office/officeart/2005/8/layout/process3"/>
     <dgm:cxn modelId="{2B2D5360-47BC-4B3C-B216-2B7929BF124D}" type="presOf" srcId="{56F62F40-C3FC-4CDE-8CDE-08742BB7EC5F}" destId="{8577333B-3F9C-4926-A988-A9AD25C07B07}" srcOrd="1" destOrd="0" presId="urn:microsoft.com/office/officeart/2005/8/layout/process3"/>
+    <dgm:cxn modelId="{892B74B8-A168-47A2-B608-00C9E7C73564}" type="presOf" srcId="{C6F74580-CCD9-44AD-A3A1-24C2F9A9A6DF}" destId="{665F6B15-2E65-46FD-986F-0FA3BC9A6879}" srcOrd="0" destOrd="0" presId="urn:microsoft.com/office/officeart/2005/8/layout/process3"/>
+    <dgm:cxn modelId="{86973022-0377-44D8-B056-7B85FE1E2172}" srcId="{F8B11C22-81F6-4198-A5E8-C2D9969C301E}" destId="{EA203AA0-1634-4AEA-A278-3E43E8C7A4EE}" srcOrd="1" destOrd="0" parTransId="{6445F28B-900F-4CE6-99E0-3AA2CFE99ADE}" sibTransId="{C6F74580-CCD9-44AD-A3A1-24C2F9A9A6DF}"/>
+    <dgm:cxn modelId="{214F6836-B03D-4541-AA6A-491A3FB30ACD}" srcId="{F8B11C22-81F6-4198-A5E8-C2D9969C301E}" destId="{2681C462-2534-436D-BAAC-013CDD61D5F3}" srcOrd="0" destOrd="0" parTransId="{75690A07-207B-45F3-AD2C-B383B6E2A266}" sibTransId="{56F62F40-C3FC-4CDE-8CDE-08742BB7EC5F}"/>
+    <dgm:cxn modelId="{731F9A29-65D3-4089-A21C-7684D2BFF107}" type="presOf" srcId="{EA203AA0-1634-4AEA-A278-3E43E8C7A4EE}" destId="{834BAC12-5A20-417C-85FE-A1BDA447FA36}" srcOrd="0" destOrd="0" presId="urn:microsoft.com/office/officeart/2005/8/layout/process3"/>
     <dgm:cxn modelId="{A158F6A3-C207-4AC4-9346-432668F680A4}" type="presOf" srcId="{56F62F40-C3FC-4CDE-8CDE-08742BB7EC5F}" destId="{EE046494-B2A4-4A5C-8FE0-78B74CD96D41}" srcOrd="0" destOrd="0" presId="urn:microsoft.com/office/officeart/2005/8/layout/process3"/>
+    <dgm:cxn modelId="{5617B2B1-7432-4C01-8BE3-6E8C6029F324}" type="presOf" srcId="{42D947BE-DAD4-42C6-9CF1-0E85614AFABC}" destId="{67AD104C-75CB-47C4-87BD-EC1C86CB35A0}" srcOrd="0" destOrd="0" presId="urn:microsoft.com/office/officeart/2005/8/layout/process3"/>
+    <dgm:cxn modelId="{DA4444BD-259E-4887-80A5-28DAFBB20A60}" type="presOf" srcId="{F0BDC9F1-6AA2-488E-A7C7-F3AC9907CA77}" destId="{0F897744-CD25-45D4-B9B9-987B482AC437}" srcOrd="0" destOrd="0" presId="urn:microsoft.com/office/officeart/2005/8/layout/process3"/>
+    <dgm:cxn modelId="{66E42723-C25E-4A9A-A8DF-486C1E4A3DE2}" type="presOf" srcId="{F8B11C22-81F6-4198-A5E8-C2D9969C301E}" destId="{36FBB6DB-AE48-4AF2-92A9-83C28B33E39A}" srcOrd="0" destOrd="0" presId="urn:microsoft.com/office/officeart/2005/8/layout/process3"/>
+    <dgm:cxn modelId="{F2CFCADA-4E74-444A-9FA2-FCB1D5396E6A}" srcId="{F8B11C22-81F6-4198-A5E8-C2D9969C301E}" destId="{7430520C-DD82-48EA-943B-E9AC08324B1C}" srcOrd="2" destOrd="0" parTransId="{EB307C31-B652-4C8D-909D-6F487501EE6B}" sibTransId="{5DC5C26F-A13D-4BEC-817F-5060D562C027}"/>
+    <dgm:cxn modelId="{715C0077-E68A-41A3-8A6E-8093909AA3B2}" type="presOf" srcId="{EA203AA0-1634-4AEA-A278-3E43E8C7A4EE}" destId="{D9F6C6A3-9F07-4B1E-888E-563845B021C7}" srcOrd="1" destOrd="0" presId="urn:microsoft.com/office/officeart/2005/8/layout/process3"/>
+    <dgm:cxn modelId="{18B7DF32-5095-428A-9F97-FDBBFD598834}" type="presOf" srcId="{7430520C-DD82-48EA-943B-E9AC08324B1C}" destId="{3D736581-7702-4485-84CF-B2F64CA9089B}" srcOrd="0" destOrd="0" presId="urn:microsoft.com/office/officeart/2005/8/layout/process3"/>
+    <dgm:cxn modelId="{295A2296-0EBF-4D1B-9D8B-F9BE174A95D9}" type="presOf" srcId="{7430520C-DD82-48EA-943B-E9AC08324B1C}" destId="{2555FB26-E090-44ED-8D17-5717C2099F53}" srcOrd="1" destOrd="0" presId="urn:microsoft.com/office/officeart/2005/8/layout/process3"/>
+    <dgm:cxn modelId="{4738627A-D0D4-4B56-9989-D8B22FAA5A07}" type="presOf" srcId="{2681C462-2534-436D-BAAC-013CDD61D5F3}" destId="{2AD3D7E7-80DE-4882-A864-F1C346E6920D}" srcOrd="1" destOrd="0" presId="urn:microsoft.com/office/officeart/2005/8/layout/process3"/>
+    <dgm:cxn modelId="{615AC532-C44B-4222-860E-E2DF108EA3ED}" srcId="{7430520C-DD82-48EA-943B-E9AC08324B1C}" destId="{F0BDC9F1-6AA2-488E-A7C7-F3AC9907CA77}" srcOrd="0" destOrd="0" parTransId="{2400E606-C13E-4194-BBAE-708C417EF550}" sibTransId="{F8033E8A-46EB-4CD2-A83C-E530145F59FF}"/>
+    <dgm:cxn modelId="{656FE334-AFC2-48B4-A41B-43F36A767E95}" type="presOf" srcId="{C6F74580-CCD9-44AD-A3A1-24C2F9A9A6DF}" destId="{D2CD5A19-CB24-4411-9A3F-E5486E7FC276}" srcOrd="1" destOrd="0" presId="urn:microsoft.com/office/officeart/2005/8/layout/process3"/>
     <dgm:cxn modelId="{E114742A-61F0-4375-A16F-7133B4AC3D52}" type="presOf" srcId="{2681C462-2534-436D-BAAC-013CDD61D5F3}" destId="{583248FC-9532-4D55-B4EA-0A13DEC13E80}" srcOrd="0" destOrd="0" presId="urn:microsoft.com/office/officeart/2005/8/layout/process3"/>
-    <dgm:cxn modelId="{214F6836-B03D-4541-AA6A-491A3FB30ACD}" srcId="{F8B11C22-81F6-4198-A5E8-C2D9969C301E}" destId="{2681C462-2534-436D-BAAC-013CDD61D5F3}" srcOrd="0" destOrd="0" parTransId="{75690A07-207B-45F3-AD2C-B383B6E2A266}" sibTransId="{56F62F40-C3FC-4CDE-8CDE-08742BB7EC5F}"/>
-    <dgm:cxn modelId="{295A2296-0EBF-4D1B-9D8B-F9BE174A95D9}" type="presOf" srcId="{7430520C-DD82-48EA-943B-E9AC08324B1C}" destId="{2555FB26-E090-44ED-8D17-5717C2099F53}" srcOrd="1" destOrd="0" presId="urn:microsoft.com/office/officeart/2005/8/layout/process3"/>
-    <dgm:cxn modelId="{86973022-0377-44D8-B056-7B85FE1E2172}" srcId="{F8B11C22-81F6-4198-A5E8-C2D9969C301E}" destId="{EA203AA0-1634-4AEA-A278-3E43E8C7A4EE}" srcOrd="1" destOrd="0" parTransId="{6445F28B-900F-4CE6-99E0-3AA2CFE99ADE}" sibTransId="{C6F74580-CCD9-44AD-A3A1-24C2F9A9A6DF}"/>
     <dgm:cxn modelId="{02536E40-5C66-4E78-869F-75252BB5BCE0}" srcId="{2681C462-2534-436D-BAAC-013CDD61D5F3}" destId="{0FE21134-2CD0-49CE-803B-B52745D979EA}" srcOrd="0" destOrd="0" parTransId="{7C3435EE-62C9-44EF-9149-A27AE49EFA43}" sibTransId="{F0D3DCFE-483B-4AC6-BF1B-E4D8B76E01BE}"/>
-    <dgm:cxn modelId="{F2CFCADA-4E74-444A-9FA2-FCB1D5396E6A}" srcId="{F8B11C22-81F6-4198-A5E8-C2D9969C301E}" destId="{7430520C-DD82-48EA-943B-E9AC08324B1C}" srcOrd="2" destOrd="0" parTransId="{EB307C31-B652-4C8D-909D-6F487501EE6B}" sibTransId="{5DC5C26F-A13D-4BEC-817F-5060D562C027}"/>
-    <dgm:cxn modelId="{5617B2B1-7432-4C01-8BE3-6E8C6029F324}" type="presOf" srcId="{42D947BE-DAD4-42C6-9CF1-0E85614AFABC}" destId="{67AD104C-75CB-47C4-87BD-EC1C86CB35A0}" srcOrd="0" destOrd="0" presId="urn:microsoft.com/office/officeart/2005/8/layout/process3"/>
+    <dgm:cxn modelId="{114C5B6E-19A9-4F4B-8534-F0E2107E621C}" srcId="{EA203AA0-1634-4AEA-A278-3E43E8C7A4EE}" destId="{42D947BE-DAD4-42C6-9CF1-0E85614AFABC}" srcOrd="0" destOrd="0" parTransId="{79EE3B1C-7960-4154-B352-97C552D82A2D}" sibTransId="{87387704-1D90-461B-972A-43A192ACF00E}"/>
     <dgm:cxn modelId="{37087DEA-D70C-4D18-8694-70DCCD87AE85}" type="presParOf" srcId="{36FBB6DB-AE48-4AF2-92A9-83C28B33E39A}" destId="{28557DD7-8D9B-4BB0-ADC4-61D8C09450B3}" srcOrd="0" destOrd="0" presId="urn:microsoft.com/office/officeart/2005/8/layout/process3"/>
     <dgm:cxn modelId="{5E41E474-3104-453F-9427-36D40C0011ED}" type="presParOf" srcId="{28557DD7-8D9B-4BB0-ADC4-61D8C09450B3}" destId="{583248FC-9532-4D55-B4EA-0A13DEC13E80}" srcOrd="0" destOrd="0" presId="urn:microsoft.com/office/officeart/2005/8/layout/process3"/>
     <dgm:cxn modelId="{8977F732-FAA5-4D36-A564-617C00BFC2EA}" type="presParOf" srcId="{28557DD7-8D9B-4BB0-ADC4-61D8C09450B3}" destId="{2AD3D7E7-80DE-4882-A864-F1C346E6920D}" srcOrd="1" destOrd="0" presId="urn:microsoft.com/office/officeart/2005/8/layout/process3"/>
@@ -6201,6 +6259,13 @@
   <p:clrMapOvr>
     <a:masterClrMapping/>
   </p:clrMapOvr>
+  <p:timing>
+    <p:tnLst>
+      <p:par>
+        <p:cTn id="1" dur="indefinite" restart="never" nodeType="tmRoot"/>
+      </p:par>
+    </p:tnLst>
+  </p:timing>
 </p:sld>
 </file>
 
@@ -6231,30 +6296,267 @@
             <p:ph type="title"/>
           </p:nvPr>
         </p:nvSpPr>
-        <p:spPr/>
+        <p:spPr>
+          <a:xfrm>
+            <a:off x="838200" y="295458"/>
+            <a:ext cx="10515600" cy="618944"/>
+          </a:xfrm>
+        </p:spPr>
+        <p:txBody>
+          <a:bodyPr>
+            <a:normAutofit fontScale="90000"/>
+          </a:bodyPr>
+          <a:lstStyle/>
+          <a:p>
+            <a:r>
+              <a:rPr lang="fr-FR" dirty="0" smtClean="0"/>
+              <a:t>Où nous en sommes</a:t>
+            </a:r>
+            <a:endParaRPr lang="fr-FR" dirty="0"/>
+          </a:p>
+        </p:txBody>
+      </p:sp>
+      <p:sp>
+        <p:nvSpPr>
+          <p:cNvPr id="3" name="Espace réservé du contenu 2"/>
+          <p:cNvSpPr>
+            <a:spLocks noGrp="1"/>
+          </p:cNvSpPr>
+          <p:nvPr>
+            <p:ph idx="1"/>
+          </p:nvPr>
+        </p:nvSpPr>
+        <p:spPr>
+          <a:xfrm>
+            <a:off x="838200" y="1227909"/>
+            <a:ext cx="10515600" cy="4949054"/>
+          </a:xfrm>
+        </p:spPr>
         <p:txBody>
           <a:bodyPr/>
           <a:lstStyle/>
           <a:p>
+            <a:r>
+              <a:rPr lang="fr-FR" dirty="0" smtClean="0"/>
+              <a:t>Premières données récupérées</a:t>
+            </a:r>
+            <a:r>
+              <a:rPr lang="fr-FR" dirty="0" smtClean="0"/>
+              <a:t>: Séquence de 4 figures</a:t>
+            </a:r>
+            <a:endParaRPr lang="fr-FR" dirty="0"/>
+          </a:p>
+        </p:txBody>
+      </p:sp>
+      <p:pic>
+        <p:nvPicPr>
+          <p:cNvPr id="4" name="Image 3"/>
+          <p:cNvPicPr>
+            <a:picLocks noChangeAspect="1"/>
+          </p:cNvPicPr>
+          <p:nvPr/>
+        </p:nvPicPr>
+        <p:blipFill rotWithShape="1">
+          <a:blip r:embed="rId2">
+            <a:extLst>
+              <a:ext uri="{28A0092B-C50C-407E-A947-70E740481C1C}">
+                <a14:useLocalDpi xmlns:a14="http://schemas.microsoft.com/office/drawing/2010/main" val="0"/>
+              </a:ext>
+            </a:extLst>
+          </a:blip>
+          <a:srcRect l="7000" t="5055" r="6429" b="3252"/>
+          <a:stretch/>
+        </p:blipFill>
+        <p:spPr>
+          <a:xfrm>
+            <a:off x="838200" y="1891211"/>
+            <a:ext cx="8551649" cy="4487499"/>
+          </a:xfrm>
+          <a:prstGeom prst="rect">
+            <a:avLst/>
+          </a:prstGeom>
+        </p:spPr>
+      </p:pic>
+      <p:sp>
+        <p:nvSpPr>
+          <p:cNvPr id="5" name="Rectangle 4"/>
+          <p:cNvSpPr/>
+          <p:nvPr/>
+        </p:nvSpPr>
+        <p:spPr>
+          <a:xfrm>
+            <a:off x="1930400" y="4277360"/>
+            <a:ext cx="252000" cy="934720"/>
+          </a:xfrm>
+          <a:prstGeom prst="rect">
+            <a:avLst/>
+          </a:prstGeom>
+          <a:noFill/>
+          <a:ln w="28575">
+            <a:solidFill>
+              <a:srgbClr val="FF0000"/>
+            </a:solidFill>
+          </a:ln>
+        </p:spPr>
+        <p:style>
+          <a:lnRef idx="2">
+            <a:schemeClr val="accent1">
+              <a:shade val="50000"/>
+            </a:schemeClr>
+          </a:lnRef>
+          <a:fillRef idx="1">
+            <a:schemeClr val="accent1"/>
+          </a:fillRef>
+          <a:effectRef idx="0">
+            <a:schemeClr val="accent1"/>
+          </a:effectRef>
+          <a:fontRef idx="minor">
+            <a:schemeClr val="lt1"/>
+          </a:fontRef>
+        </p:style>
+        <p:txBody>
+          <a:bodyPr rtlCol="0" anchor="ctr"/>
+          <a:lstStyle/>
+          <a:p>
+            <a:pPr algn="ctr"/>
             <a:endParaRPr lang="fr-FR"/>
           </a:p>
         </p:txBody>
       </p:sp>
       <p:sp>
         <p:nvSpPr>
-          <p:cNvPr id="3" name="Espace réservé du contenu 2"/>
-          <p:cNvSpPr>
-            <a:spLocks noGrp="1"/>
-          </p:cNvSpPr>
-          <p:nvPr>
-            <p:ph idx="1"/>
-          </p:nvPr>
-        </p:nvSpPr>
-        <p:spPr/>
-        <p:txBody>
-          <a:bodyPr/>
+          <p:cNvPr id="6" name="Rectangle 5"/>
+          <p:cNvSpPr/>
+          <p:nvPr/>
+        </p:nvSpPr>
+        <p:spPr>
+          <a:xfrm>
+            <a:off x="2540000" y="4297680"/>
+            <a:ext cx="254000" cy="1706880"/>
+          </a:xfrm>
+          <a:prstGeom prst="rect">
+            <a:avLst/>
+          </a:prstGeom>
+          <a:noFill/>
+          <a:ln w="28575">
+            <a:solidFill>
+              <a:srgbClr val="FF0000"/>
+            </a:solidFill>
+          </a:ln>
+        </p:spPr>
+        <p:style>
+          <a:lnRef idx="2">
+            <a:schemeClr val="accent1">
+              <a:shade val="50000"/>
+            </a:schemeClr>
+          </a:lnRef>
+          <a:fillRef idx="1">
+            <a:schemeClr val="accent1"/>
+          </a:fillRef>
+          <a:effectRef idx="0">
+            <a:schemeClr val="accent1"/>
+          </a:effectRef>
+          <a:fontRef idx="minor">
+            <a:schemeClr val="lt1"/>
+          </a:fontRef>
+        </p:style>
+        <p:txBody>
+          <a:bodyPr rtlCol="0" anchor="ctr"/>
           <a:lstStyle/>
           <a:p>
+            <a:pPr algn="ctr"/>
+            <a:endParaRPr lang="fr-FR"/>
+          </a:p>
+        </p:txBody>
+      </p:sp>
+      <p:sp>
+        <p:nvSpPr>
+          <p:cNvPr id="7" name="Rectangle 6"/>
+          <p:cNvSpPr/>
+          <p:nvPr/>
+        </p:nvSpPr>
+        <p:spPr>
+          <a:xfrm>
+            <a:off x="3274600" y="4297680"/>
+            <a:ext cx="252000" cy="934720"/>
+          </a:xfrm>
+          <a:prstGeom prst="rect">
+            <a:avLst/>
+          </a:prstGeom>
+          <a:noFill/>
+          <a:ln w="28575">
+            <a:solidFill>
+              <a:srgbClr val="FF0000"/>
+            </a:solidFill>
+          </a:ln>
+        </p:spPr>
+        <p:style>
+          <a:lnRef idx="2">
+            <a:schemeClr val="accent1">
+              <a:shade val="50000"/>
+            </a:schemeClr>
+          </a:lnRef>
+          <a:fillRef idx="1">
+            <a:schemeClr val="accent1"/>
+          </a:fillRef>
+          <a:effectRef idx="0">
+            <a:schemeClr val="accent1"/>
+          </a:effectRef>
+          <a:fontRef idx="minor">
+            <a:schemeClr val="lt1"/>
+          </a:fontRef>
+        </p:style>
+        <p:txBody>
+          <a:bodyPr rtlCol="0" anchor="ctr"/>
+          <a:lstStyle/>
+          <a:p>
+            <a:pPr algn="ctr"/>
+            <a:endParaRPr lang="fr-FR"/>
+          </a:p>
+        </p:txBody>
+      </p:sp>
+      <p:sp>
+        <p:nvSpPr>
+          <p:cNvPr id="8" name="Rectangle 7"/>
+          <p:cNvSpPr/>
+          <p:nvPr/>
+        </p:nvSpPr>
+        <p:spPr>
+          <a:xfrm>
+            <a:off x="3872040" y="4287520"/>
+            <a:ext cx="273240" cy="1717040"/>
+          </a:xfrm>
+          <a:prstGeom prst="rect">
+            <a:avLst/>
+          </a:prstGeom>
+          <a:noFill/>
+          <a:ln w="28575">
+            <a:solidFill>
+              <a:srgbClr val="FF0000"/>
+            </a:solidFill>
+          </a:ln>
+        </p:spPr>
+        <p:style>
+          <a:lnRef idx="2">
+            <a:schemeClr val="accent1">
+              <a:shade val="50000"/>
+            </a:schemeClr>
+          </a:lnRef>
+          <a:fillRef idx="1">
+            <a:schemeClr val="accent1"/>
+          </a:fillRef>
+          <a:effectRef idx="0">
+            <a:schemeClr val="accent1"/>
+          </a:effectRef>
+          <a:fontRef idx="minor">
+            <a:schemeClr val="lt1"/>
+          </a:fontRef>
+        </p:style>
+        <p:txBody>
+          <a:bodyPr rtlCol="0" anchor="ctr"/>
+          <a:lstStyle/>
+          <a:p>
+            <a:pPr algn="ctr"/>
             <a:endParaRPr lang="fr-FR"/>
           </a:p>
         </p:txBody>
@@ -6262,13 +6564,20 @@
     </p:spTree>
     <p:extLst>
       <p:ext uri="{BB962C8B-B14F-4D97-AF65-F5344CB8AC3E}">
-        <p14:creationId xmlns:p14="http://schemas.microsoft.com/office/powerpoint/2010/main" val="2462678741"/>
+        <p14:creationId xmlns:p14="http://schemas.microsoft.com/office/powerpoint/2010/main" val="2609291212"/>
       </p:ext>
     </p:extLst>
   </p:cSld>
   <p:clrMapOvr>
     <a:masterClrMapping/>
   </p:clrMapOvr>
+  <p:timing>
+    <p:tnLst>
+      <p:par>
+        <p:cTn id="1" dur="indefinite" restart="never" nodeType="tmRoot"/>
+      </p:par>
+    </p:tnLst>
+  </p:timing>
 </p:sld>
 </file>
 
@@ -6299,38 +6608,599 @@
             <p:ph type="title"/>
           </p:nvPr>
         </p:nvSpPr>
-        <p:spPr/>
+        <p:spPr>
+          <a:xfrm>
+            <a:off x="838200" y="262800"/>
+            <a:ext cx="10515600" cy="618944"/>
+          </a:xfrm>
+        </p:spPr>
+        <p:txBody>
+          <a:bodyPr>
+            <a:normAutofit fontScale="90000"/>
+          </a:bodyPr>
+          <a:lstStyle/>
+          <a:p>
+            <a:r>
+              <a:rPr lang="fr-FR" dirty="0" smtClean="0"/>
+              <a:t>Où nous en sommes</a:t>
+            </a:r>
+            <a:endParaRPr lang="fr-FR" dirty="0"/>
+          </a:p>
+        </p:txBody>
+      </p:sp>
+      <p:sp>
+        <p:nvSpPr>
+          <p:cNvPr id="3" name="Espace réservé du contenu 2"/>
+          <p:cNvSpPr>
+            <a:spLocks noGrp="1"/>
+          </p:cNvSpPr>
+          <p:nvPr>
+            <p:ph idx="1"/>
+          </p:nvPr>
+        </p:nvSpPr>
+        <p:spPr>
+          <a:xfrm>
+            <a:off x="838200" y="1085669"/>
+            <a:ext cx="10515600" cy="4949054"/>
+          </a:xfrm>
+        </p:spPr>
         <p:txBody>
           <a:bodyPr/>
           <a:lstStyle/>
           <a:p>
-            <a:endParaRPr lang="fr-FR"/>
-          </a:p>
-        </p:txBody>
-      </p:sp>
-      <p:sp>
-        <p:nvSpPr>
-          <p:cNvPr id="3" name="Espace réservé du contenu 2"/>
-          <p:cNvSpPr>
-            <a:spLocks noGrp="1"/>
-          </p:cNvSpPr>
-          <p:nvPr>
-            <p:ph idx="1"/>
-          </p:nvPr>
-        </p:nvSpPr>
-        <p:spPr/>
-        <p:txBody>
-          <a:bodyPr/>
-          <a:lstStyle/>
-          <a:p>
-            <a:endParaRPr lang="fr-FR"/>
-          </a:p>
-        </p:txBody>
-      </p:sp>
+            <a:r>
+              <a:rPr lang="fr-FR" dirty="0" smtClean="0"/>
+              <a:t>Premières données récupérées</a:t>
+            </a:r>
+            <a:r>
+              <a:rPr lang="fr-FR" dirty="0" smtClean="0"/>
+              <a:t>: </a:t>
+            </a:r>
+            <a:r>
+              <a:rPr lang="fr-FR" dirty="0" err="1" smtClean="0"/>
+              <a:t>Ollie</a:t>
+            </a:r>
+            <a:r>
+              <a:rPr lang="fr-FR" dirty="0" smtClean="0"/>
+              <a:t> (saut)</a:t>
+            </a:r>
+            <a:endParaRPr lang="fr-FR" dirty="0"/>
+          </a:p>
+        </p:txBody>
+      </p:sp>
+      <p:pic>
+        <p:nvPicPr>
+          <p:cNvPr id="5" name="Espace réservé du contenu 3"/>
+          <p:cNvPicPr>
+            <a:picLocks noChangeAspect="1"/>
+          </p:cNvPicPr>
+          <p:nvPr/>
+        </p:nvPicPr>
+        <p:blipFill rotWithShape="1">
+          <a:blip r:embed="rId2">
+            <a:extLst>
+              <a:ext uri="{28A0092B-C50C-407E-A947-70E740481C1C}">
+                <a14:useLocalDpi xmlns:a14="http://schemas.microsoft.com/office/drawing/2010/main" val="0"/>
+              </a:ext>
+            </a:extLst>
+          </a:blip>
+          <a:srcRect l="6181" r="6190"/>
+          <a:stretch/>
+        </p:blipFill>
+        <p:spPr>
+          <a:xfrm>
+            <a:off x="838200" y="1493520"/>
+            <a:ext cx="8643585" cy="4886959"/>
+          </a:xfrm>
+          <a:prstGeom prst="rect">
+            <a:avLst/>
+          </a:prstGeom>
+        </p:spPr>
+      </p:pic>
     </p:spTree>
     <p:extLst>
       <p:ext uri="{BB962C8B-B14F-4D97-AF65-F5344CB8AC3E}">
-        <p14:creationId xmlns:p14="http://schemas.microsoft.com/office/powerpoint/2010/main" val="3675281912"/>
+        <p14:creationId xmlns:p14="http://schemas.microsoft.com/office/powerpoint/2010/main" val="3626999891"/>
+      </p:ext>
+    </p:extLst>
+  </p:cSld>
+  <p:clrMapOvr>
+    <a:masterClrMapping/>
+  </p:clrMapOvr>
+  <p:timing>
+    <p:tnLst>
+      <p:par>
+        <p:cTn id="1" dur="indefinite" restart="never" nodeType="tmRoot"/>
+      </p:par>
+    </p:tnLst>
+  </p:timing>
+</p:sld>
+</file>
+
+<file path=ppt/slides/slide12.xml><?xml version="1.0" encoding="utf-8"?>
+<p:sld xmlns:a="http://schemas.openxmlformats.org/drawingml/2006/main" xmlns:r="http://schemas.openxmlformats.org/officeDocument/2006/relationships" xmlns:p="http://schemas.openxmlformats.org/presentationml/2006/main">
+  <p:cSld>
+    <p:spTree>
+      <p:nvGrpSpPr>
+        <p:cNvPr id="1" name=""/>
+        <p:cNvGrpSpPr/>
+        <p:nvPr/>
+      </p:nvGrpSpPr>
+      <p:grpSpPr>
+        <a:xfrm>
+          <a:off x="0" y="0"/>
+          <a:ext cx="0" cy="0"/>
+          <a:chOff x="0" y="0"/>
+          <a:chExt cx="0" cy="0"/>
+        </a:xfrm>
+      </p:grpSpPr>
+      <p:sp>
+        <p:nvSpPr>
+          <p:cNvPr id="2" name="Titre 1"/>
+          <p:cNvSpPr>
+            <a:spLocks noGrp="1"/>
+          </p:cNvSpPr>
+          <p:nvPr>
+            <p:ph type="title"/>
+          </p:nvPr>
+        </p:nvSpPr>
+        <p:spPr>
+          <a:xfrm>
+            <a:off x="838200" y="295458"/>
+            <a:ext cx="10515600" cy="618944"/>
+          </a:xfrm>
+        </p:spPr>
+        <p:txBody>
+          <a:bodyPr>
+            <a:normAutofit fontScale="90000"/>
+          </a:bodyPr>
+          <a:lstStyle/>
+          <a:p>
+            <a:r>
+              <a:rPr lang="fr-FR" dirty="0" smtClean="0"/>
+              <a:t>Où nous en sommes</a:t>
+            </a:r>
+            <a:endParaRPr lang="fr-FR" dirty="0"/>
+          </a:p>
+        </p:txBody>
+      </p:sp>
+      <p:sp>
+        <p:nvSpPr>
+          <p:cNvPr id="3" name="Espace réservé du contenu 2"/>
+          <p:cNvSpPr>
+            <a:spLocks noGrp="1"/>
+          </p:cNvSpPr>
+          <p:nvPr>
+            <p:ph idx="1"/>
+          </p:nvPr>
+        </p:nvSpPr>
+        <p:spPr>
+          <a:xfrm>
+            <a:off x="838200" y="1227909"/>
+            <a:ext cx="10515600" cy="4949054"/>
+          </a:xfrm>
+        </p:spPr>
+        <p:txBody>
+          <a:bodyPr/>
+          <a:lstStyle/>
+          <a:p>
+            <a:r>
+              <a:rPr lang="fr-FR" dirty="0" smtClean="0"/>
+              <a:t>Premières données récupérées</a:t>
+            </a:r>
+            <a:r>
+              <a:rPr lang="fr-FR" dirty="0" smtClean="0"/>
+              <a:t>: </a:t>
+            </a:r>
+            <a:r>
+              <a:rPr lang="fr-FR" dirty="0" err="1" smtClean="0"/>
+              <a:t>Kickflip</a:t>
+            </a:r>
+            <a:r>
+              <a:rPr lang="fr-FR" dirty="0" smtClean="0"/>
+              <a:t> (rotation selon y)</a:t>
+            </a:r>
+            <a:endParaRPr lang="fr-FR" dirty="0"/>
+          </a:p>
+        </p:txBody>
+      </p:sp>
+      <p:pic>
+        <p:nvPicPr>
+          <p:cNvPr id="5" name="Image 4"/>
+          <p:cNvPicPr>
+            <a:picLocks noChangeAspect="1"/>
+          </p:cNvPicPr>
+          <p:nvPr/>
+        </p:nvPicPr>
+        <p:blipFill rotWithShape="1">
+          <a:blip r:embed="rId2">
+            <a:extLst>
+              <a:ext uri="{28A0092B-C50C-407E-A947-70E740481C1C}">
+                <a14:useLocalDpi xmlns:a14="http://schemas.microsoft.com/office/drawing/2010/main" val="0"/>
+              </a:ext>
+            </a:extLst>
+          </a:blip>
+          <a:srcRect l="6116" t="4116" r="6947" b="4074"/>
+          <a:stretch/>
+        </p:blipFill>
+        <p:spPr>
+          <a:xfrm>
+            <a:off x="838200" y="1781753"/>
+            <a:ext cx="8400242" cy="4395210"/>
+          </a:xfrm>
+          <a:prstGeom prst="rect">
+            <a:avLst/>
+          </a:prstGeom>
+        </p:spPr>
+      </p:pic>
+    </p:spTree>
+    <p:extLst>
+      <p:ext uri="{BB962C8B-B14F-4D97-AF65-F5344CB8AC3E}">
+        <p14:creationId xmlns:p14="http://schemas.microsoft.com/office/powerpoint/2010/main" val="1710787610"/>
+      </p:ext>
+    </p:extLst>
+  </p:cSld>
+  <p:clrMapOvr>
+    <a:masterClrMapping/>
+  </p:clrMapOvr>
+  <p:timing>
+    <p:tnLst>
+      <p:par>
+        <p:cTn id="1" dur="indefinite" restart="never" nodeType="tmRoot"/>
+      </p:par>
+    </p:tnLst>
+  </p:timing>
+</p:sld>
+</file>
+
+<file path=ppt/slides/slide13.xml><?xml version="1.0" encoding="utf-8"?>
+<p:sld xmlns:a="http://schemas.openxmlformats.org/drawingml/2006/main" xmlns:r="http://schemas.openxmlformats.org/officeDocument/2006/relationships" xmlns:p="http://schemas.openxmlformats.org/presentationml/2006/main">
+  <p:cSld>
+    <p:spTree>
+      <p:nvGrpSpPr>
+        <p:cNvPr id="1" name=""/>
+        <p:cNvGrpSpPr/>
+        <p:nvPr/>
+      </p:nvGrpSpPr>
+      <p:grpSpPr>
+        <a:xfrm>
+          <a:off x="0" y="0"/>
+          <a:ext cx="0" cy="0"/>
+          <a:chOff x="0" y="0"/>
+          <a:chExt cx="0" cy="0"/>
+        </a:xfrm>
+      </p:grpSpPr>
+      <p:sp>
+        <p:nvSpPr>
+          <p:cNvPr id="2" name="Titre 1"/>
+          <p:cNvSpPr>
+            <a:spLocks noGrp="1"/>
+          </p:cNvSpPr>
+          <p:nvPr>
+            <p:ph type="title"/>
+          </p:nvPr>
+        </p:nvSpPr>
+        <p:spPr>
+          <a:xfrm>
+            <a:off x="838200" y="295458"/>
+            <a:ext cx="10515600" cy="618944"/>
+          </a:xfrm>
+        </p:spPr>
+        <p:txBody>
+          <a:bodyPr>
+            <a:normAutofit fontScale="90000"/>
+          </a:bodyPr>
+          <a:lstStyle/>
+          <a:p>
+            <a:r>
+              <a:rPr lang="fr-FR" dirty="0" smtClean="0"/>
+              <a:t>Où nous en sommes</a:t>
+            </a:r>
+            <a:endParaRPr lang="fr-FR" dirty="0"/>
+          </a:p>
+        </p:txBody>
+      </p:sp>
+      <p:sp>
+        <p:nvSpPr>
+          <p:cNvPr id="3" name="Espace réservé du contenu 2"/>
+          <p:cNvSpPr>
+            <a:spLocks noGrp="1"/>
+          </p:cNvSpPr>
+          <p:nvPr>
+            <p:ph idx="1"/>
+          </p:nvPr>
+        </p:nvSpPr>
+        <p:spPr>
+          <a:xfrm>
+            <a:off x="838200" y="1227909"/>
+            <a:ext cx="10515600" cy="4949054"/>
+          </a:xfrm>
+        </p:spPr>
+        <p:txBody>
+          <a:bodyPr/>
+          <a:lstStyle/>
+          <a:p>
+            <a:r>
+              <a:rPr lang="fr-FR" dirty="0" smtClean="0"/>
+              <a:t>Premières données récupérées</a:t>
+            </a:r>
+            <a:r>
+              <a:rPr lang="fr-FR" dirty="0" smtClean="0"/>
+              <a:t>: </a:t>
+            </a:r>
+            <a:r>
+              <a:rPr lang="fr-FR" dirty="0" err="1" smtClean="0"/>
+              <a:t>Frontside</a:t>
+            </a:r>
+            <a:r>
+              <a:rPr lang="fr-FR" dirty="0" smtClean="0"/>
+              <a:t> </a:t>
+            </a:r>
+            <a:r>
+              <a:rPr lang="fr-FR" dirty="0" err="1" smtClean="0"/>
+              <a:t>Shove-it</a:t>
+            </a:r>
+            <a:r>
+              <a:rPr lang="fr-FR" dirty="0" smtClean="0"/>
+              <a:t> (rotation selon z)</a:t>
+            </a:r>
+            <a:endParaRPr lang="fr-FR" dirty="0"/>
+          </a:p>
+        </p:txBody>
+      </p:sp>
+      <p:pic>
+        <p:nvPicPr>
+          <p:cNvPr id="4" name="Image 3"/>
+          <p:cNvPicPr>
+            <a:picLocks noChangeAspect="1"/>
+          </p:cNvPicPr>
+          <p:nvPr/>
+        </p:nvPicPr>
+        <p:blipFill rotWithShape="1">
+          <a:blip r:embed="rId2">
+            <a:extLst>
+              <a:ext uri="{28A0092B-C50C-407E-A947-70E740481C1C}">
+                <a14:useLocalDpi xmlns:a14="http://schemas.microsoft.com/office/drawing/2010/main" val="0"/>
+              </a:ext>
+            </a:extLst>
+          </a:blip>
+          <a:srcRect l="8083" t="6352" r="6666" b="4334"/>
+          <a:stretch/>
+        </p:blipFill>
+        <p:spPr>
+          <a:xfrm>
+            <a:off x="838200" y="1802180"/>
+            <a:ext cx="9032240" cy="4688290"/>
+          </a:xfrm>
+          <a:prstGeom prst="rect">
+            <a:avLst/>
+          </a:prstGeom>
+        </p:spPr>
+      </p:pic>
+    </p:spTree>
+    <p:extLst>
+      <p:ext uri="{BB962C8B-B14F-4D97-AF65-F5344CB8AC3E}">
+        <p14:creationId xmlns:p14="http://schemas.microsoft.com/office/powerpoint/2010/main" val="4243904900"/>
+      </p:ext>
+    </p:extLst>
+  </p:cSld>
+  <p:clrMapOvr>
+    <a:masterClrMapping/>
+  </p:clrMapOvr>
+  <p:timing>
+    <p:tnLst>
+      <p:par>
+        <p:cTn id="1" dur="indefinite" restart="never" nodeType="tmRoot"/>
+      </p:par>
+    </p:tnLst>
+  </p:timing>
+</p:sld>
+</file>
+
+<file path=ppt/slides/slide14.xml><?xml version="1.0" encoding="utf-8"?>
+<p:sld xmlns:a="http://schemas.openxmlformats.org/drawingml/2006/main" xmlns:r="http://schemas.openxmlformats.org/officeDocument/2006/relationships" xmlns:p="http://schemas.openxmlformats.org/presentationml/2006/main">
+  <p:cSld>
+    <p:spTree>
+      <p:nvGrpSpPr>
+        <p:cNvPr id="1" name=""/>
+        <p:cNvGrpSpPr/>
+        <p:nvPr/>
+      </p:nvGrpSpPr>
+      <p:grpSpPr>
+        <a:xfrm>
+          <a:off x="0" y="0"/>
+          <a:ext cx="0" cy="0"/>
+          <a:chOff x="0" y="0"/>
+          <a:chExt cx="0" cy="0"/>
+        </a:xfrm>
+      </p:grpSpPr>
+      <p:sp>
+        <p:nvSpPr>
+          <p:cNvPr id="2" name="Titre 1"/>
+          <p:cNvSpPr>
+            <a:spLocks noGrp="1"/>
+          </p:cNvSpPr>
+          <p:nvPr>
+            <p:ph type="title"/>
+          </p:nvPr>
+        </p:nvSpPr>
+        <p:spPr>
+          <a:xfrm>
+            <a:off x="838200" y="294006"/>
+            <a:ext cx="10515600" cy="470898"/>
+          </a:xfrm>
+        </p:spPr>
+        <p:txBody>
+          <a:bodyPr>
+            <a:normAutofit fontScale="90000"/>
+          </a:bodyPr>
+          <a:lstStyle/>
+          <a:p>
+            <a:r>
+              <a:rPr lang="fr-FR" dirty="0" smtClean="0"/>
+              <a:t>Prochaines étapes ?</a:t>
+            </a:r>
+          </a:p>
+        </p:txBody>
+      </p:sp>
+      <p:sp>
+        <p:nvSpPr>
+          <p:cNvPr id="5" name="Espace réservé du contenu 4"/>
+          <p:cNvSpPr>
+            <a:spLocks noGrp="1"/>
+          </p:cNvSpPr>
+          <p:nvPr>
+            <p:ph idx="1"/>
+          </p:nvPr>
+        </p:nvSpPr>
+        <p:spPr>
+          <a:xfrm>
+            <a:off x="838200" y="1026160"/>
+            <a:ext cx="10515600" cy="5150803"/>
+          </a:xfrm>
+        </p:spPr>
+        <p:txBody>
+          <a:bodyPr/>
+          <a:lstStyle/>
+          <a:p>
+            <a:r>
+              <a:rPr lang="fr-FR" dirty="0" smtClean="0"/>
+              <a:t>Les prochaines étapes sur le cours terme :</a:t>
+            </a:r>
+          </a:p>
+          <a:p>
+            <a:pPr lvl="1">
+              <a:buFont typeface="Courier New" panose="02070309020205020404" pitchFamily="49" charset="0"/>
+              <a:buChar char="o"/>
+            </a:pPr>
+            <a:r>
+              <a:rPr lang="fr-FR" dirty="0" smtClean="0"/>
+              <a:t>Continuer à récupérer des données de figures</a:t>
+            </a:r>
+          </a:p>
+          <a:p>
+            <a:pPr lvl="1">
+              <a:buFont typeface="Courier New" panose="02070309020205020404" pitchFamily="49" charset="0"/>
+              <a:buChar char="o"/>
+            </a:pPr>
+            <a:r>
+              <a:rPr lang="fr-FR" dirty="0" smtClean="0"/>
+              <a:t>Organisation du code à finir</a:t>
+            </a:r>
+          </a:p>
+          <a:p>
+            <a:pPr lvl="1">
+              <a:buFont typeface="Courier New" panose="02070309020205020404" pitchFamily="49" charset="0"/>
+              <a:buChar char="o"/>
+            </a:pPr>
+            <a:endParaRPr lang="fr-FR" dirty="0" smtClean="0"/>
+          </a:p>
+          <a:p>
+            <a:pPr lvl="1">
+              <a:buFont typeface="Courier New" panose="02070309020205020404" pitchFamily="49" charset="0"/>
+              <a:buChar char="o"/>
+            </a:pPr>
+            <a:r>
+              <a:rPr lang="fr-FR" dirty="0" smtClean="0"/>
+              <a:t>Commencer à faire de la reconnaissance de mouvement : </a:t>
+            </a:r>
+          </a:p>
+          <a:p>
+            <a:pPr lvl="2">
+              <a:buFont typeface="Courier New" panose="02070309020205020404" pitchFamily="49" charset="0"/>
+              <a:buChar char="o"/>
+            </a:pPr>
+            <a:r>
+              <a:rPr lang="fr-FR" dirty="0" smtClean="0"/>
+              <a:t>Détection du début et de la fin d’une figure</a:t>
+            </a:r>
+          </a:p>
+          <a:p>
+            <a:pPr lvl="2">
+              <a:buFont typeface="Courier New" panose="02070309020205020404" pitchFamily="49" charset="0"/>
+              <a:buChar char="o"/>
+            </a:pPr>
+            <a:r>
+              <a:rPr lang="fr-FR" dirty="0"/>
+              <a:t>S</a:t>
+            </a:r>
+            <a:r>
+              <a:rPr lang="fr-FR" dirty="0" smtClean="0"/>
+              <a:t>élection de méthodes de reconnaissances de mouvement</a:t>
+            </a:r>
+          </a:p>
+        </p:txBody>
+      </p:sp>
+    </p:spTree>
+    <p:extLst>
+      <p:ext uri="{BB962C8B-B14F-4D97-AF65-F5344CB8AC3E}">
+        <p14:creationId xmlns:p14="http://schemas.microsoft.com/office/powerpoint/2010/main" val="2682112765"/>
+      </p:ext>
+    </p:extLst>
+  </p:cSld>
+  <p:clrMapOvr>
+    <a:masterClrMapping/>
+  </p:clrMapOvr>
+  <p:timing>
+    <p:tnLst>
+      <p:par>
+        <p:cTn id="1" dur="indefinite" restart="never" nodeType="tmRoot"/>
+      </p:par>
+    </p:tnLst>
+  </p:timing>
+</p:sld>
+</file>
+
+<file path=ppt/slides/slide15.xml><?xml version="1.0" encoding="utf-8"?>
+<p:sld xmlns:a="http://schemas.openxmlformats.org/drawingml/2006/main" xmlns:r="http://schemas.openxmlformats.org/officeDocument/2006/relationships" xmlns:p="http://schemas.openxmlformats.org/presentationml/2006/main">
+  <p:cSld>
+    <p:spTree>
+      <p:nvGrpSpPr>
+        <p:cNvPr id="1" name=""/>
+        <p:cNvGrpSpPr/>
+        <p:nvPr/>
+      </p:nvGrpSpPr>
+      <p:grpSpPr>
+        <a:xfrm>
+          <a:off x="0" y="0"/>
+          <a:ext cx="0" cy="0"/>
+          <a:chOff x="0" y="0"/>
+          <a:chExt cx="0" cy="0"/>
+        </a:xfrm>
+      </p:grpSpPr>
+      <p:sp>
+        <p:nvSpPr>
+          <p:cNvPr id="2" name="Titre 1"/>
+          <p:cNvSpPr>
+            <a:spLocks noGrp="1"/>
+          </p:cNvSpPr>
+          <p:nvPr>
+            <p:ph type="title"/>
+          </p:nvPr>
+        </p:nvSpPr>
+        <p:spPr>
+          <a:xfrm>
+            <a:off x="3662680" y="3057525"/>
+            <a:ext cx="4373880" cy="508635"/>
+          </a:xfrm>
+        </p:spPr>
+        <p:txBody>
+          <a:bodyPr>
+            <a:normAutofit fontScale="90000"/>
+          </a:bodyPr>
+          <a:lstStyle/>
+          <a:p>
+            <a:r>
+              <a:rPr lang="fr-FR" dirty="0"/>
+              <a:t>Prochaines étapes ?</a:t>
+            </a:r>
+          </a:p>
+        </p:txBody>
+      </p:sp>
+    </p:spTree>
+    <p:extLst>
+      <p:ext uri="{BB962C8B-B14F-4D97-AF65-F5344CB8AC3E}">
+        <p14:creationId xmlns:p14="http://schemas.microsoft.com/office/powerpoint/2010/main" val="2024456789"/>
       </p:ext>
     </p:extLst>
   </p:cSld>
@@ -6447,6 +7317,13 @@
   <p:clrMapOvr>
     <a:masterClrMapping/>
   </p:clrMapOvr>
+  <p:timing>
+    <p:tnLst>
+      <p:par>
+        <p:cTn id="1" dur="indefinite" restart="never" nodeType="tmRoot"/>
+      </p:par>
+    </p:tnLst>
+  </p:timing>
 </p:sld>
 </file>
 
@@ -6509,18 +7386,143 @@
         </p:nvSpPr>
         <p:spPr>
           <a:xfrm>
-            <a:off x="838200" y="1114698"/>
-            <a:ext cx="10515600" cy="5062266"/>
+            <a:off x="838200" y="1107440"/>
+            <a:ext cx="9707880" cy="1595120"/>
           </a:xfrm>
         </p:spPr>
         <p:txBody>
-          <a:bodyPr/>
+          <a:bodyPr>
+            <a:normAutofit fontScale="92500" lnSpcReduction="20000"/>
+          </a:bodyPr>
           <a:lstStyle/>
           <a:p>
+            <a:r>
+              <a:rPr lang="fr-FR" dirty="0" smtClean="0"/>
+              <a:t>Discipline où l’objectif est de réaliser des figures</a:t>
+            </a:r>
+          </a:p>
+          <a:p>
             <a:endParaRPr lang="fr-FR" dirty="0"/>
           </a:p>
-        </p:txBody>
-      </p:sp>
+          <a:p>
+            <a:r>
+              <a:rPr lang="fr-FR" dirty="0" smtClean="0"/>
+              <a:t>On s’intéresse pour l’instant aux figures réalisés au sol et « simples » d’analyse</a:t>
+            </a:r>
+          </a:p>
+        </p:txBody>
+      </p:sp>
+      <p:pic>
+        <p:nvPicPr>
+          <p:cNvPr id="1026" name="Picture 2" descr="Les 10 tricks en skate les plus utilisés | skate genève"/>
+          <p:cNvPicPr>
+            <a:picLocks noChangeAspect="1" noChangeArrowheads="1"/>
+          </p:cNvPicPr>
+          <p:nvPr/>
+        </p:nvPicPr>
+        <p:blipFill>
+          <a:blip r:embed="rId2" cstate="print">
+            <a:extLst>
+              <a:ext uri="{28A0092B-C50C-407E-A947-70E740481C1C}">
+                <a14:useLocalDpi xmlns:a14="http://schemas.microsoft.com/office/drawing/2010/main" val="0"/>
+              </a:ext>
+            </a:extLst>
+          </a:blip>
+          <a:srcRect/>
+          <a:stretch>
+            <a:fillRect/>
+          </a:stretch>
+        </p:blipFill>
+        <p:spPr bwMode="auto">
+          <a:xfrm>
+            <a:off x="1153160" y="3081021"/>
+            <a:ext cx="2860040" cy="2145409"/>
+          </a:xfrm>
+          <a:prstGeom prst="rect">
+            <a:avLst/>
+          </a:prstGeom>
+          <a:noFill/>
+          <a:ln w="28575">
+            <a:solidFill>
+              <a:srgbClr val="FF0000"/>
+            </a:solidFill>
+          </a:ln>
+          <a:extLst>
+            <a:ext uri="{909E8E84-426E-40DD-AFC4-6F175D3DCCD1}">
+              <a14:hiddenFill xmlns:a14="http://schemas.microsoft.com/office/drawing/2010/main">
+                <a:solidFill>
+                  <a:srgbClr val="FFFFFF"/>
+                </a:solidFill>
+              </a14:hiddenFill>
+            </a:ext>
+          </a:extLst>
+        </p:spPr>
+      </p:pic>
+      <p:pic>
+        <p:nvPicPr>
+          <p:cNvPr id="1028" name="Picture 4" descr="Photo libre de droit de Skateur Effectuant Un Toboggan De Conseil banque  d'images et plus d'images libres de droit de Activité - iStock"/>
+          <p:cNvPicPr>
+            <a:picLocks noChangeAspect="1" noChangeArrowheads="1"/>
+          </p:cNvPicPr>
+          <p:nvPr/>
+        </p:nvPicPr>
+        <p:blipFill>
+          <a:blip r:embed="rId3">
+            <a:extLst>
+              <a:ext uri="{28A0092B-C50C-407E-A947-70E740481C1C}">
+                <a14:useLocalDpi xmlns:a14="http://schemas.microsoft.com/office/drawing/2010/main" val="0"/>
+              </a:ext>
+            </a:extLst>
+          </a:blip>
+          <a:srcRect/>
+          <a:stretch>
+            <a:fillRect/>
+          </a:stretch>
+        </p:blipFill>
+        <p:spPr bwMode="auto">
+          <a:xfrm>
+            <a:off x="4825365" y="3081021"/>
+            <a:ext cx="1733550" cy="2628900"/>
+          </a:xfrm>
+          <a:prstGeom prst="rect">
+            <a:avLst/>
+          </a:prstGeom>
+          <a:noFill/>
+          <a:extLst>
+            <a:ext uri="{909E8E84-426E-40DD-AFC4-6F175D3DCCD1}">
+              <a14:hiddenFill xmlns:a14="http://schemas.microsoft.com/office/drawing/2010/main">
+                <a:solidFill>
+                  <a:srgbClr val="FFFFFF"/>
+                </a:solidFill>
+              </a14:hiddenFill>
+            </a:ext>
+          </a:extLst>
+        </p:spPr>
+      </p:pic>
+      <p:pic>
+        <p:nvPicPr>
+          <p:cNvPr id="4" name="Image 3"/>
+          <p:cNvPicPr>
+            <a:picLocks noChangeAspect="1"/>
+          </p:cNvPicPr>
+          <p:nvPr/>
+        </p:nvPicPr>
+        <p:blipFill>
+          <a:blip r:embed="rId4"/>
+          <a:stretch>
+            <a:fillRect/>
+          </a:stretch>
+        </p:blipFill>
+        <p:spPr>
+          <a:xfrm>
+            <a:off x="7371079" y="3081020"/>
+            <a:ext cx="3297463" cy="1846579"/>
+          </a:xfrm>
+          <a:prstGeom prst="rect">
+            <a:avLst/>
+          </a:prstGeom>
+        </p:spPr>
+      </p:pic>
     </p:spTree>
     <p:extLst>
       <p:ext uri="{BB962C8B-B14F-4D97-AF65-F5344CB8AC3E}">
@@ -6531,6 +7533,13 @@
   <p:clrMapOvr>
     <a:masterClrMapping/>
   </p:clrMapOvr>
+  <p:timing>
+    <p:tnLst>
+      <p:par>
+        <p:cTn id="1" dur="indefinite" restart="never" nodeType="tmRoot"/>
+      </p:par>
+    </p:tnLst>
+  </p:timing>
 </p:sld>
 </file>
 
@@ -6657,7 +7666,31 @@
           <a:p>
             <a:r>
               <a:rPr lang="fr-FR" dirty="0" smtClean="0"/>
-              <a:t>Projet similaire au skate : RGB lampe</a:t>
+              <a:t>Projet similaire au skate : RGB </a:t>
+            </a:r>
+            <a:r>
+              <a:rPr lang="fr-FR" dirty="0" smtClean="0"/>
+              <a:t>lampe</a:t>
+            </a:r>
+          </a:p>
+          <a:p>
+            <a:pPr lvl="1">
+              <a:buFont typeface="Courier New" panose="02070309020205020404" pitchFamily="49" charset="0"/>
+              <a:buChar char="o"/>
+            </a:pPr>
+            <a:r>
+              <a:rPr lang="fr-FR" dirty="0" smtClean="0"/>
+              <a:t>Projet de reconnaissance de mouvement</a:t>
+            </a:r>
+          </a:p>
+          <a:p>
+            <a:pPr lvl="1">
+              <a:buFont typeface="Courier New" panose="02070309020205020404" pitchFamily="49" charset="0"/>
+              <a:buChar char="o"/>
+            </a:pPr>
+            <a:r>
+              <a:rPr lang="fr-FR" dirty="0" smtClean="0"/>
+              <a:t>Algorithme de type HHMM utilisé ici</a:t>
             </a:r>
             <a:endParaRPr lang="fr-FR" dirty="0"/>
           </a:p>
@@ -6703,7 +7736,7 @@
         </p:blipFill>
         <p:spPr>
           <a:xfrm>
-            <a:off x="7201443" y="3638808"/>
+            <a:off x="7323363" y="3638808"/>
             <a:ext cx="4152356" cy="2538155"/>
           </a:xfrm>
           <a:prstGeom prst="rect">
@@ -6721,6 +7754,13 @@
   <p:clrMapOvr>
     <a:masterClrMapping/>
   </p:clrMapOvr>
+  <p:timing>
+    <p:tnLst>
+      <p:par>
+        <p:cTn id="1" dur="indefinite" restart="never" nodeType="tmRoot"/>
+      </p:par>
+    </p:tnLst>
+  </p:timing>
 </p:sld>
 </file>
 
@@ -6899,12 +7939,12 @@
               <a:t>Définir des </a:t>
             </a:r>
             <a:r>
-              <a:rPr lang="fr-FR" dirty="0" err="1" smtClean="0"/>
-              <a:t>caractéristics</a:t>
-            </a:r>
-            <a:r>
               <a:rPr lang="fr-FR" dirty="0" smtClean="0"/>
-              <a:t> pouvant noter la qualité d’une figure (signature gestuelle)</a:t>
+              <a:t>caractéristiques </a:t>
+            </a:r>
+            <a:r>
+              <a:rPr lang="fr-FR" dirty="0" smtClean="0"/>
+              <a:t>pouvant noter la qualité d’une figure (signature gestuelle)</a:t>
             </a:r>
             <a:endParaRPr lang="fr-FR" dirty="0"/>
           </a:p>
@@ -6959,6 +7999,13 @@
   <p:clrMapOvr>
     <a:masterClrMapping/>
   </p:clrMapOvr>
+  <p:timing>
+    <p:tnLst>
+      <p:par>
+        <p:cTn id="1" dur="indefinite" restart="never" nodeType="tmRoot"/>
+      </p:par>
+    </p:tnLst>
+  </p:timing>
 </p:sld>
 </file>
 
@@ -6991,6 +8038,185 @@
         </p:nvSpPr>
         <p:spPr>
           <a:xfrm>
+            <a:off x="838200" y="443502"/>
+            <a:ext cx="10515600" cy="610235"/>
+          </a:xfrm>
+        </p:spPr>
+        <p:txBody>
+          <a:bodyPr>
+            <a:normAutofit fontScale="90000"/>
+          </a:bodyPr>
+          <a:lstStyle/>
+          <a:p>
+            <a:r>
+              <a:rPr lang="fr-FR" dirty="0" smtClean="0"/>
+              <a:t>Le projet : Objectifs et problématiques</a:t>
+            </a:r>
+            <a:br>
+              <a:rPr lang="fr-FR" dirty="0" smtClean="0"/>
+            </a:br>
+            <a:endParaRPr lang="fr-FR" dirty="0"/>
+          </a:p>
+        </p:txBody>
+      </p:sp>
+      <p:sp>
+        <p:nvSpPr>
+          <p:cNvPr id="3" name="Espace réservé du contenu 2"/>
+          <p:cNvSpPr>
+            <a:spLocks noGrp="1"/>
+          </p:cNvSpPr>
+          <p:nvPr>
+            <p:ph idx="1"/>
+          </p:nvPr>
+        </p:nvSpPr>
+        <p:spPr>
+          <a:xfrm>
+            <a:off x="838200" y="1053737"/>
+            <a:ext cx="10515600" cy="5201603"/>
+          </a:xfrm>
+        </p:spPr>
+        <p:txBody>
+          <a:bodyPr>
+            <a:normAutofit/>
+          </a:bodyPr>
+          <a:lstStyle/>
+          <a:p>
+            <a:r>
+              <a:rPr lang="fr-FR" dirty="0" smtClean="0"/>
+              <a:t>Problématiques </a:t>
+            </a:r>
+            <a:r>
+              <a:rPr lang="fr-FR" dirty="0" smtClean="0"/>
+              <a:t>:</a:t>
+            </a:r>
+          </a:p>
+          <a:p>
+            <a:pPr lvl="1">
+              <a:buFont typeface="Courier New" panose="02070309020205020404" pitchFamily="49" charset="0"/>
+              <a:buChar char="o"/>
+            </a:pPr>
+            <a:r>
+              <a:rPr lang="fr-FR" dirty="0"/>
+              <a:t>Traitement des données brutes :</a:t>
+            </a:r>
+          </a:p>
+          <a:p>
+            <a:pPr lvl="2">
+              <a:buFont typeface="Wingdings" panose="05000000000000000000" pitchFamily="2" charset="2"/>
+              <a:buChar char="v"/>
+            </a:pPr>
+            <a:r>
+              <a:rPr lang="fr-FR" dirty="0"/>
+              <a:t>Filtrage des données ;</a:t>
+            </a:r>
+          </a:p>
+          <a:p>
+            <a:pPr lvl="2">
+              <a:buFont typeface="Wingdings" panose="05000000000000000000" pitchFamily="2" charset="2"/>
+              <a:buChar char="v"/>
+            </a:pPr>
+            <a:r>
+              <a:rPr lang="fr-FR" dirty="0"/>
+              <a:t>Correction des défauts des différents capteurs (dérive du gyroscope et bruit de l’accéléromètre).</a:t>
+            </a:r>
+          </a:p>
+          <a:p>
+            <a:pPr lvl="1">
+              <a:buFont typeface="Courier New" panose="02070309020205020404" pitchFamily="49" charset="0"/>
+              <a:buChar char="o"/>
+            </a:pPr>
+            <a:r>
+              <a:rPr lang="fr-FR" dirty="0" smtClean="0"/>
+              <a:t>Problématique </a:t>
+            </a:r>
+            <a:r>
+              <a:rPr lang="fr-FR" dirty="0"/>
+              <a:t>propre au skate (peut-être limite du projet) : </a:t>
+            </a:r>
+          </a:p>
+          <a:p>
+            <a:pPr lvl="2">
+              <a:buFont typeface="Wingdings" panose="05000000000000000000" pitchFamily="2" charset="2"/>
+              <a:buChar char="v"/>
+            </a:pPr>
+            <a:r>
+              <a:rPr lang="fr-FR" dirty="0"/>
+              <a:t>Comment différencier un 180 d’une simple rotation de skate (</a:t>
+            </a:r>
+            <a:r>
+              <a:rPr lang="fr-FR" dirty="0" err="1"/>
+              <a:t>shove-it</a:t>
+            </a:r>
+            <a:r>
+              <a:rPr lang="fr-FR" dirty="0"/>
+              <a:t>) ?</a:t>
+            </a:r>
+          </a:p>
+          <a:p>
+            <a:pPr lvl="2">
+              <a:buFont typeface="Wingdings" panose="05000000000000000000" pitchFamily="2" charset="2"/>
+              <a:buChar char="Ø"/>
+            </a:pPr>
+            <a:endParaRPr lang="fr-FR" dirty="0" smtClean="0"/>
+          </a:p>
+          <a:p>
+            <a:pPr lvl="1">
+              <a:buFont typeface="Courier New" panose="02070309020205020404" pitchFamily="49" charset="0"/>
+              <a:buChar char="o"/>
+            </a:pPr>
+            <a:endParaRPr lang="fr-FR" dirty="0"/>
+          </a:p>
+        </p:txBody>
+      </p:sp>
+    </p:spTree>
+    <p:extLst>
+      <p:ext uri="{BB962C8B-B14F-4D97-AF65-F5344CB8AC3E}">
+        <p14:creationId xmlns:p14="http://schemas.microsoft.com/office/powerpoint/2010/main" val="4073448656"/>
+      </p:ext>
+    </p:extLst>
+  </p:cSld>
+  <p:clrMapOvr>
+    <a:masterClrMapping/>
+  </p:clrMapOvr>
+  <p:timing>
+    <p:tnLst>
+      <p:par>
+        <p:cTn id="1" dur="indefinite" restart="never" nodeType="tmRoot"/>
+      </p:par>
+    </p:tnLst>
+  </p:timing>
+</p:sld>
+</file>
+
+<file path=ppt/slides/slide7.xml><?xml version="1.0" encoding="utf-8"?>
+<p:sld xmlns:a="http://schemas.openxmlformats.org/drawingml/2006/main" xmlns:r="http://schemas.openxmlformats.org/officeDocument/2006/relationships" xmlns:p="http://schemas.openxmlformats.org/presentationml/2006/main">
+  <p:cSld>
+    <p:spTree>
+      <p:nvGrpSpPr>
+        <p:cNvPr id="1" name=""/>
+        <p:cNvGrpSpPr/>
+        <p:nvPr/>
+      </p:nvGrpSpPr>
+      <p:grpSpPr>
+        <a:xfrm>
+          <a:off x="0" y="0"/>
+          <a:ext cx="0" cy="0"/>
+          <a:chOff x="0" y="0"/>
+          <a:chExt cx="0" cy="0"/>
+        </a:xfrm>
+      </p:grpSpPr>
+      <p:sp>
+        <p:nvSpPr>
+          <p:cNvPr id="2" name="Titre 1"/>
+          <p:cNvSpPr>
+            <a:spLocks noGrp="1"/>
+          </p:cNvSpPr>
+          <p:nvPr>
+            <p:ph type="title"/>
+          </p:nvPr>
+        </p:nvSpPr>
+        <p:spPr>
+          <a:xfrm>
             <a:off x="838200" y="365126"/>
             <a:ext cx="10515600" cy="479606"/>
           </a:xfrm>
@@ -7005,7 +8231,6 @@
               <a:rPr lang="fr-FR" dirty="0" smtClean="0"/>
               <a:t>Où nous en sommes</a:t>
             </a:r>
-            <a:endParaRPr lang="fr-FR" dirty="0" smtClean="0"/>
           </a:p>
         </p:txBody>
       </p:sp>
@@ -7041,7 +8266,11 @@
             </a:pPr>
             <a:r>
               <a:rPr lang="fr-FR" dirty="0" smtClean="0"/>
-              <a:t>Capteur fixé sous le skate</a:t>
+              <a:t>Capteur fixé sous le </a:t>
+            </a:r>
+            <a:r>
+              <a:rPr lang="fr-FR" dirty="0" smtClean="0"/>
+              <a:t>skate</a:t>
             </a:r>
           </a:p>
         </p:txBody>
@@ -7066,7 +8295,7 @@
         </p:blipFill>
         <p:spPr>
           <a:xfrm rot="5400000">
-            <a:off x="8943975" y="1409429"/>
+            <a:off x="8504277" y="1188902"/>
             <a:ext cx="2753995" cy="2065655"/>
           </a:xfrm>
           <a:prstGeom prst="rect">
@@ -7094,8 +8323,38 @@
         </p:blipFill>
         <p:spPr>
           <a:xfrm rot="5400000">
-            <a:off x="6633482" y="1422129"/>
-            <a:ext cx="2739390" cy="2054860"/>
+            <a:off x="5405108" y="1243240"/>
+            <a:ext cx="3402148" cy="2605133"/>
+          </a:xfrm>
+          <a:prstGeom prst="rect">
+            <a:avLst/>
+          </a:prstGeom>
+        </p:spPr>
+      </p:pic>
+      <p:pic>
+        <p:nvPicPr>
+          <p:cNvPr id="7" name="Image 6"/>
+          <p:cNvPicPr>
+            <a:picLocks noChangeAspect="1"/>
+          </p:cNvPicPr>
+          <p:nvPr/>
+        </p:nvPicPr>
+        <p:blipFill>
+          <a:blip r:embed="rId4">
+            <a:extLst>
+              <a:ext uri="{28A0092B-C50C-407E-A947-70E740481C1C}">
+                <a14:useLocalDpi xmlns:a14="http://schemas.microsoft.com/office/drawing/2010/main" val="0"/>
+              </a:ext>
+            </a:extLst>
+          </a:blip>
+          <a:stretch>
+            <a:fillRect/>
+          </a:stretch>
+        </p:blipFill>
+        <p:spPr>
+          <a:xfrm>
+            <a:off x="1282541" y="2464941"/>
+            <a:ext cx="3673158" cy="2964437"/>
           </a:xfrm>
           <a:prstGeom prst="rect">
             <a:avLst/>
@@ -7112,125 +8371,13 @@
   <p:clrMapOvr>
     <a:masterClrMapping/>
   </p:clrMapOvr>
-</p:sld>
-</file>
-
-<file path=ppt/slides/slide7.xml><?xml version="1.0" encoding="utf-8"?>
-<p:sld xmlns:a="http://schemas.openxmlformats.org/drawingml/2006/main" xmlns:r="http://schemas.openxmlformats.org/officeDocument/2006/relationships" xmlns:p="http://schemas.openxmlformats.org/presentationml/2006/main">
-  <p:cSld>
-    <p:spTree>
-      <p:nvGrpSpPr>
-        <p:cNvPr id="1" name=""/>
-        <p:cNvGrpSpPr/>
-        <p:nvPr/>
-      </p:nvGrpSpPr>
-      <p:grpSpPr>
-        <a:xfrm>
-          <a:off x="0" y="0"/>
-          <a:ext cx="0" cy="0"/>
-          <a:chOff x="0" y="0"/>
-          <a:chExt cx="0" cy="0"/>
-        </a:xfrm>
-      </p:grpSpPr>
-      <p:sp>
-        <p:nvSpPr>
-          <p:cNvPr id="2" name="Titre 1"/>
-          <p:cNvSpPr>
-            <a:spLocks noGrp="1"/>
-          </p:cNvSpPr>
-          <p:nvPr>
-            <p:ph type="title"/>
-          </p:nvPr>
-        </p:nvSpPr>
-        <p:spPr>
-          <a:xfrm>
-            <a:off x="838200" y="365126"/>
-            <a:ext cx="10515600" cy="409938"/>
-          </a:xfrm>
-        </p:spPr>
-        <p:txBody>
-          <a:bodyPr>
-            <a:normAutofit fontScale="90000"/>
-          </a:bodyPr>
-          <a:lstStyle/>
-          <a:p>
-            <a:r>
-              <a:rPr lang="fr-FR" dirty="0" smtClean="0"/>
-              <a:t>Où nous en sommes</a:t>
-            </a:r>
-            <a:endParaRPr lang="fr-FR" dirty="0"/>
-          </a:p>
-        </p:txBody>
-      </p:sp>
-      <p:sp>
-        <p:nvSpPr>
-          <p:cNvPr id="3" name="Espace réservé du contenu 2"/>
-          <p:cNvSpPr>
-            <a:spLocks noGrp="1"/>
-          </p:cNvSpPr>
-          <p:nvPr>
-            <p:ph idx="1"/>
-          </p:nvPr>
-        </p:nvSpPr>
-        <p:spPr>
-          <a:xfrm>
-            <a:off x="838200" y="1175657"/>
-            <a:ext cx="10515600" cy="5001306"/>
-          </a:xfrm>
-        </p:spPr>
-        <p:txBody>
-          <a:bodyPr/>
-          <a:lstStyle/>
-          <a:p>
-            <a:r>
-              <a:rPr lang="fr-FR" dirty="0" smtClean="0"/>
-              <a:t>Programme d’extraction des données :</a:t>
-            </a:r>
-          </a:p>
-          <a:p>
-            <a:pPr lvl="1">
-              <a:buFont typeface="Courier New" panose="02070309020205020404" pitchFamily="49" charset="0"/>
-              <a:buChar char="o"/>
-            </a:pPr>
-            <a:r>
-              <a:rPr lang="fr-FR" dirty="0" smtClean="0"/>
-              <a:t>Processus de récupération des données opérationnel</a:t>
-            </a:r>
-          </a:p>
-        </p:txBody>
-      </p:sp>
-      <p:graphicFrame>
-        <p:nvGraphicFramePr>
-          <p:cNvPr id="5" name="Diagramme 4"/>
-          <p:cNvGraphicFramePr/>
-          <p:nvPr>
-            <p:extLst>
-              <p:ext uri="{D42A27DB-BD31-4B8C-83A1-F6EECF244321}">
-                <p14:modId xmlns:p14="http://schemas.microsoft.com/office/powerpoint/2010/main" val="3265888820"/>
-              </p:ext>
-            </p:extLst>
-          </p:nvPr>
-        </p:nvGraphicFramePr>
-        <p:xfrm>
-          <a:off x="1744617" y="2204561"/>
-          <a:ext cx="7634513" cy="2943498"/>
-        </p:xfrm>
-        <a:graphic>
-          <a:graphicData uri="http://schemas.openxmlformats.org/drawingml/2006/diagram">
-            <dgm:relIds xmlns:dgm="http://schemas.openxmlformats.org/drawingml/2006/diagram" xmlns:r="http://schemas.openxmlformats.org/officeDocument/2006/relationships" r:dm="rId2" r:lo="rId3" r:qs="rId4" r:cs="rId5"/>
-          </a:graphicData>
-        </a:graphic>
-      </p:graphicFrame>
-    </p:spTree>
-    <p:extLst>
-      <p:ext uri="{BB962C8B-B14F-4D97-AF65-F5344CB8AC3E}">
-        <p14:creationId xmlns:p14="http://schemas.microsoft.com/office/powerpoint/2010/main" val="1901925826"/>
-      </p:ext>
-    </p:extLst>
-  </p:cSld>
-  <p:clrMapOvr>
-    <a:masterClrMapping/>
-  </p:clrMapOvr>
+  <p:timing>
+    <p:tnLst>
+      <p:par>
+        <p:cTn id="1" dur="indefinite" restart="never" nodeType="tmRoot"/>
+      </p:par>
+    </p:tnLst>
+  </p:timing>
 </p:sld>
 </file>
 
@@ -7263,8 +8410,8 @@
         </p:nvSpPr>
         <p:spPr>
           <a:xfrm>
-            <a:off x="838200" y="295458"/>
-            <a:ext cx="10515600" cy="618944"/>
+            <a:off x="838200" y="365126"/>
+            <a:ext cx="10515600" cy="409938"/>
           </a:xfrm>
         </p:spPr>
         <p:txBody>
@@ -7293,8 +8440,8 @@
         </p:nvSpPr>
         <p:spPr>
           <a:xfrm>
-            <a:off x="838200" y="1227909"/>
-            <a:ext cx="10515600" cy="4949054"/>
+            <a:off x="838200" y="1175657"/>
+            <a:ext cx="10515600" cy="5001306"/>
           </a:xfrm>
         </p:spPr>
         <p:txBody>
@@ -7303,22 +8450,64 @@
           <a:p>
             <a:r>
               <a:rPr lang="fr-FR" dirty="0" smtClean="0"/>
-              <a:t>Premières données récupérées:</a:t>
-            </a:r>
-            <a:endParaRPr lang="fr-FR" dirty="0"/>
-          </a:p>
-        </p:txBody>
-      </p:sp>
+              <a:t>Programme d’extraction des données :</a:t>
+            </a:r>
+          </a:p>
+          <a:p>
+            <a:pPr lvl="1">
+              <a:buFont typeface="Courier New" panose="02070309020205020404" pitchFamily="49" charset="0"/>
+              <a:buChar char="o"/>
+            </a:pPr>
+            <a:r>
+              <a:rPr lang="fr-FR" dirty="0" smtClean="0"/>
+              <a:t>Processus de récupération des données </a:t>
+            </a:r>
+            <a:r>
+              <a:rPr lang="fr-FR" dirty="0" smtClean="0"/>
+              <a:t>opérationnel</a:t>
+            </a:r>
+          </a:p>
+        </p:txBody>
+      </p:sp>
+      <p:graphicFrame>
+        <p:nvGraphicFramePr>
+          <p:cNvPr id="5" name="Diagramme 4"/>
+          <p:cNvGraphicFramePr/>
+          <p:nvPr>
+            <p:extLst>
+              <p:ext uri="{D42A27DB-BD31-4B8C-83A1-F6EECF244321}">
+                <p14:modId xmlns:p14="http://schemas.microsoft.com/office/powerpoint/2010/main" val="2552776177"/>
+              </p:ext>
+            </p:extLst>
+          </p:nvPr>
+        </p:nvGraphicFramePr>
+        <p:xfrm>
+          <a:off x="1734457" y="2204561"/>
+          <a:ext cx="7634513" cy="2943498"/>
+        </p:xfrm>
+        <a:graphic>
+          <a:graphicData uri="http://schemas.openxmlformats.org/drawingml/2006/diagram">
+            <dgm:relIds xmlns:dgm="http://schemas.openxmlformats.org/drawingml/2006/diagram" xmlns:r="http://schemas.openxmlformats.org/officeDocument/2006/relationships" r:dm="rId2" r:lo="rId3" r:qs="rId4" r:cs="rId5"/>
+          </a:graphicData>
+        </a:graphic>
+      </p:graphicFrame>
     </p:spTree>
     <p:extLst>
       <p:ext uri="{BB962C8B-B14F-4D97-AF65-F5344CB8AC3E}">
-        <p14:creationId xmlns:p14="http://schemas.microsoft.com/office/powerpoint/2010/main" val="3297804566"/>
+        <p14:creationId xmlns:p14="http://schemas.microsoft.com/office/powerpoint/2010/main" val="1901925826"/>
       </p:ext>
     </p:extLst>
   </p:cSld>
   <p:clrMapOvr>
     <a:masterClrMapping/>
   </p:clrMapOvr>
+  <p:timing>
+    <p:tnLst>
+      <p:par>
+        <p:cTn id="1" dur="indefinite" restart="never" nodeType="tmRoot"/>
+      </p:par>
+    </p:tnLst>
+  </p:timing>
 </p:sld>
 </file>
 
@@ -7351,8 +8540,8 @@
         </p:nvSpPr>
         <p:spPr>
           <a:xfrm>
-            <a:off x="838200" y="365126"/>
-            <a:ext cx="10515600" cy="470898"/>
+            <a:off x="838200" y="295458"/>
+            <a:ext cx="10515600" cy="618944"/>
           </a:xfrm>
         </p:spPr>
         <p:txBody>
@@ -7363,9 +8552,9 @@
           <a:p>
             <a:r>
               <a:rPr lang="fr-FR" dirty="0" smtClean="0"/>
-              <a:t>Prochaines étapes ?</a:t>
-            </a:r>
-            <a:endParaRPr lang="fr-FR" dirty="0" smtClean="0"/>
+              <a:t>Où nous en sommes</a:t>
+            </a:r>
+            <a:endParaRPr lang="fr-FR" dirty="0"/>
           </a:p>
         </p:txBody>
       </p:sp>
@@ -7381,14 +8570,81 @@
         </p:nvSpPr>
         <p:spPr>
           <a:xfrm>
-            <a:off x="838200" y="1184366"/>
-            <a:ext cx="10515600" cy="4992597"/>
+            <a:off x="838200" y="1227909"/>
+            <a:ext cx="10515600" cy="4949054"/>
           </a:xfrm>
         </p:spPr>
         <p:txBody>
           <a:bodyPr/>
           <a:lstStyle/>
           <a:p>
+            <a:r>
+              <a:rPr lang="fr-FR" dirty="0" smtClean="0"/>
+              <a:t>Premières données récupérées</a:t>
+            </a:r>
+            <a:r>
+              <a:rPr lang="fr-FR" dirty="0" smtClean="0"/>
+              <a:t>: Séquence de 4 figures</a:t>
+            </a:r>
+            <a:endParaRPr lang="fr-FR" dirty="0"/>
+          </a:p>
+        </p:txBody>
+      </p:sp>
+      <p:pic>
+        <p:nvPicPr>
+          <p:cNvPr id="4" name="Image 3"/>
+          <p:cNvPicPr>
+            <a:picLocks noChangeAspect="1"/>
+          </p:cNvPicPr>
+          <p:nvPr/>
+        </p:nvPicPr>
+        <p:blipFill rotWithShape="1">
+          <a:blip r:embed="rId2">
+            <a:extLst>
+              <a:ext uri="{28A0092B-C50C-407E-A947-70E740481C1C}">
+                <a14:useLocalDpi xmlns:a14="http://schemas.microsoft.com/office/drawing/2010/main" val="0"/>
+              </a:ext>
+            </a:extLst>
+          </a:blip>
+          <a:srcRect l="7000" t="5055" r="6429" b="3252"/>
+          <a:stretch/>
+        </p:blipFill>
+        <p:spPr>
+          <a:xfrm>
+            <a:off x="838200" y="1891211"/>
+            <a:ext cx="8551649" cy="4487499"/>
+          </a:xfrm>
+          <a:prstGeom prst="rect">
+            <a:avLst/>
+          </a:prstGeom>
+        </p:spPr>
+      </p:pic>
+      <p:sp>
+        <p:nvSpPr>
+          <p:cNvPr id="10" name="ZoneTexte 9"/>
+          <p:cNvSpPr txBox="1"/>
+          <p:nvPr/>
+        </p:nvSpPr>
+        <p:spPr>
+          <a:xfrm>
+            <a:off x="5114024" y="5530632"/>
+            <a:ext cx="4690376" cy="646331"/>
+          </a:xfrm>
+          <a:prstGeom prst="rect">
+            <a:avLst/>
+          </a:prstGeom>
+          <a:noFill/>
+        </p:spPr>
+        <p:txBody>
+          <a:bodyPr wrap="square" rtlCol="0">
+            <a:spAutoFit/>
+          </a:bodyPr>
+          <a:lstStyle/>
+          <a:p>
+            <a:r>
+              <a:rPr lang="fr-FR" dirty="0" smtClean="0"/>
+              <a:t>Données récupérées avec une fréquence d’acquisition moyenne de 70Hz</a:t>
+            </a:r>
             <a:endParaRPr lang="fr-FR" dirty="0"/>
           </a:p>
         </p:txBody>
@@ -7396,13 +8652,20 @@
     </p:spTree>
     <p:extLst>
       <p:ext uri="{BB962C8B-B14F-4D97-AF65-F5344CB8AC3E}">
-        <p14:creationId xmlns:p14="http://schemas.microsoft.com/office/powerpoint/2010/main" val="2682112765"/>
+        <p14:creationId xmlns:p14="http://schemas.microsoft.com/office/powerpoint/2010/main" val="3297804566"/>
       </p:ext>
     </p:extLst>
   </p:cSld>
   <p:clrMapOvr>
     <a:masterClrMapping/>
   </p:clrMapOvr>
+  <p:timing>
+    <p:tnLst>
+      <p:par>
+        <p:cTn id="1" dur="indefinite" restart="never" nodeType="tmRoot"/>
+      </p:par>
+    </p:tnLst>
+  </p:timing>
 </p:sld>
 </file>
 

</xml_diff>